<commit_message>
[Add] view prototype to slides
</commit_message>
<xml_diff>
--- a/spec.pptx
+++ b/spec.pptx
@@ -5,8 +5,11 @@
     <p:sldMasterId id="2147483648" r:id="rId1"/>
   </p:sldMasterIdLst>
   <p:sldIdLst>
-    <p:sldId id="256" r:id="rId2"/>
-    <p:sldId id="257" r:id="rId3"/>
+    <p:sldId id="258" r:id="rId2"/>
+    <p:sldId id="256" r:id="rId3"/>
+    <p:sldId id="257" r:id="rId4"/>
+    <p:sldId id="259" r:id="rId5"/>
+    <p:sldId id="260" r:id="rId6"/>
   </p:sldIdLst>
   <p:sldSz cx="12192000" cy="6858000"/>
   <p:notesSz cx="6858000" cy="9144000"/>
@@ -260,7 +263,7 @@
           <a:p>
             <a:fld id="{7C17FDC2-0203-7F4F-8DD2-3A636CCB9E3F}" type="datetimeFigureOut">
               <a:rPr kumimoji="1" lang="ja-JP" altLang="en-US" smtClean="0"/>
-              <a:t>2019/11/28</a:t>
+              <a:t>2019/11/29</a:t>
             </a:fld>
             <a:endParaRPr kumimoji="1" lang="ja-JP" altLang="en-US"/>
           </a:p>
@@ -490,7 +493,7 @@
           <a:p>
             <a:fld id="{7C17FDC2-0203-7F4F-8DD2-3A636CCB9E3F}" type="datetimeFigureOut">
               <a:rPr kumimoji="1" lang="ja-JP" altLang="en-US" smtClean="0"/>
-              <a:t>2019/11/28</a:t>
+              <a:t>2019/11/29</a:t>
             </a:fld>
             <a:endParaRPr kumimoji="1" lang="ja-JP" altLang="en-US"/>
           </a:p>
@@ -730,7 +733,7 @@
           <a:p>
             <a:fld id="{7C17FDC2-0203-7F4F-8DD2-3A636CCB9E3F}" type="datetimeFigureOut">
               <a:rPr kumimoji="1" lang="ja-JP" altLang="en-US" smtClean="0"/>
-              <a:t>2019/11/28</a:t>
+              <a:t>2019/11/29</a:t>
             </a:fld>
             <a:endParaRPr kumimoji="1" lang="ja-JP" altLang="en-US"/>
           </a:p>
@@ -960,7 +963,7 @@
           <a:p>
             <a:fld id="{7C17FDC2-0203-7F4F-8DD2-3A636CCB9E3F}" type="datetimeFigureOut">
               <a:rPr kumimoji="1" lang="ja-JP" altLang="en-US" smtClean="0"/>
-              <a:t>2019/11/28</a:t>
+              <a:t>2019/11/29</a:t>
             </a:fld>
             <a:endParaRPr kumimoji="1" lang="ja-JP" altLang="en-US"/>
           </a:p>
@@ -1235,7 +1238,7 @@
           <a:p>
             <a:fld id="{7C17FDC2-0203-7F4F-8DD2-3A636CCB9E3F}" type="datetimeFigureOut">
               <a:rPr kumimoji="1" lang="ja-JP" altLang="en-US" smtClean="0"/>
-              <a:t>2019/11/28</a:t>
+              <a:t>2019/11/29</a:t>
             </a:fld>
             <a:endParaRPr kumimoji="1" lang="ja-JP" altLang="en-US"/>
           </a:p>
@@ -1564,7 +1567,7 @@
           <a:p>
             <a:fld id="{7C17FDC2-0203-7F4F-8DD2-3A636CCB9E3F}" type="datetimeFigureOut">
               <a:rPr kumimoji="1" lang="ja-JP" altLang="en-US" smtClean="0"/>
-              <a:t>2019/11/28</a:t>
+              <a:t>2019/11/29</a:t>
             </a:fld>
             <a:endParaRPr kumimoji="1" lang="ja-JP" altLang="en-US"/>
           </a:p>
@@ -2040,7 +2043,7 @@
           <a:p>
             <a:fld id="{7C17FDC2-0203-7F4F-8DD2-3A636CCB9E3F}" type="datetimeFigureOut">
               <a:rPr kumimoji="1" lang="ja-JP" altLang="en-US" smtClean="0"/>
-              <a:t>2019/11/28</a:t>
+              <a:t>2019/11/29</a:t>
             </a:fld>
             <a:endParaRPr kumimoji="1" lang="ja-JP" altLang="en-US"/>
           </a:p>
@@ -2181,7 +2184,7 @@
           <a:p>
             <a:fld id="{7C17FDC2-0203-7F4F-8DD2-3A636CCB9E3F}" type="datetimeFigureOut">
               <a:rPr kumimoji="1" lang="ja-JP" altLang="en-US" smtClean="0"/>
-              <a:t>2019/11/28</a:t>
+              <a:t>2019/11/29</a:t>
             </a:fld>
             <a:endParaRPr kumimoji="1" lang="ja-JP" altLang="en-US"/>
           </a:p>
@@ -2294,7 +2297,7 @@
           <a:p>
             <a:fld id="{7C17FDC2-0203-7F4F-8DD2-3A636CCB9E3F}" type="datetimeFigureOut">
               <a:rPr kumimoji="1" lang="ja-JP" altLang="en-US" smtClean="0"/>
-              <a:t>2019/11/28</a:t>
+              <a:t>2019/11/29</a:t>
             </a:fld>
             <a:endParaRPr kumimoji="1" lang="ja-JP" altLang="en-US"/>
           </a:p>
@@ -2637,7 +2640,7 @@
           <a:p>
             <a:fld id="{7C17FDC2-0203-7F4F-8DD2-3A636CCB9E3F}" type="datetimeFigureOut">
               <a:rPr kumimoji="1" lang="ja-JP" altLang="en-US" smtClean="0"/>
-              <a:t>2019/11/28</a:t>
+              <a:t>2019/11/29</a:t>
             </a:fld>
             <a:endParaRPr kumimoji="1" lang="ja-JP" altLang="en-US"/>
           </a:p>
@@ -2925,7 +2928,7 @@
           <a:p>
             <a:fld id="{7C17FDC2-0203-7F4F-8DD2-3A636CCB9E3F}" type="datetimeFigureOut">
               <a:rPr kumimoji="1" lang="ja-JP" altLang="en-US" smtClean="0"/>
-              <a:t>2019/11/28</a:t>
+              <a:t>2019/11/29</a:t>
             </a:fld>
             <a:endParaRPr kumimoji="1" lang="ja-JP" altLang="en-US"/>
           </a:p>
@@ -3198,7 +3201,7 @@
           <a:p>
             <a:fld id="{7C17FDC2-0203-7F4F-8DD2-3A636CCB9E3F}" type="datetimeFigureOut">
               <a:rPr kumimoji="1" lang="ja-JP" altLang="en-US" smtClean="0"/>
-              <a:t>2019/11/28</a:t>
+              <a:t>2019/11/29</a:t>
             </a:fld>
             <a:endParaRPr kumimoji="1" lang="ja-JP" altLang="en-US"/>
           </a:p>
@@ -3617,6 +3620,104 @@
       </p:grpSpPr>
       <p:sp>
         <p:nvSpPr>
+          <p:cNvPr id="2" name="タイトル 1">
+            <a:extLst>
+              <a:ext uri="{FF2B5EF4-FFF2-40B4-BE49-F238E27FC236}">
+                <a16:creationId xmlns:a16="http://schemas.microsoft.com/office/drawing/2014/main" id="{F9415DE4-56D8-A940-AC74-C8D3CE58C70E}"/>
+              </a:ext>
+            </a:extLst>
+          </p:cNvPr>
+          <p:cNvSpPr>
+            <a:spLocks noGrp="1"/>
+          </p:cNvSpPr>
+          <p:nvPr>
+            <p:ph type="title"/>
+          </p:nvPr>
+        </p:nvSpPr>
+        <p:spPr>
+          <a:xfrm>
+            <a:off x="838200" y="2766218"/>
+            <a:ext cx="10515600" cy="1325563"/>
+          </a:xfrm>
+        </p:spPr>
+        <p:txBody>
+          <a:bodyPr>
+            <a:normAutofit fontScale="90000"/>
+          </a:bodyPr>
+          <a:lstStyle/>
+          <a:p>
+            <a:pPr algn="ctr"/>
+            <a:r>
+              <a:rPr lang="ja-JP" altLang="en-US" sz="4800" b="1">
+                <a:solidFill>
+                  <a:srgbClr val="00B0F0"/>
+                </a:solidFill>
+                <a:latin typeface="Hiragino Kaku Gothic ProN W6" panose="020B0300000000000000" pitchFamily="34" charset="-128"/>
+                <a:ea typeface="Hiragino Kaku Gothic ProN W6" panose="020B0300000000000000" pitchFamily="34" charset="-128"/>
+              </a:rPr>
+              <a:t>ハンドジェスチャを利用した</a:t>
+            </a:r>
+            <a:br>
+              <a:rPr lang="en-US" altLang="ja-JP" sz="4800" b="1" dirty="0">
+                <a:solidFill>
+                  <a:srgbClr val="00B0F0"/>
+                </a:solidFill>
+                <a:latin typeface="Hiragino Kaku Gothic ProN W6" panose="020B0300000000000000" pitchFamily="34" charset="-128"/>
+                <a:ea typeface="Hiragino Kaku Gothic ProN W6" panose="020B0300000000000000" pitchFamily="34" charset="-128"/>
+              </a:rPr>
+            </a:br>
+            <a:r>
+              <a:rPr lang="ja-JP" altLang="en-US" sz="4800" b="1">
+                <a:solidFill>
+                  <a:srgbClr val="00B0F0"/>
+                </a:solidFill>
+                <a:latin typeface="Hiragino Kaku Gothic ProN W6" panose="020B0300000000000000" pitchFamily="34" charset="-128"/>
+                <a:ea typeface="Hiragino Kaku Gothic ProN W6" panose="020B0300000000000000" pitchFamily="34" charset="-128"/>
+              </a:rPr>
+              <a:t>テトリス対戦ゲームの構築について</a:t>
+            </a:r>
+            <a:endParaRPr kumimoji="1" lang="ja-JP" altLang="en-US" sz="4800" b="1">
+              <a:solidFill>
+                <a:srgbClr val="00B0F0"/>
+              </a:solidFill>
+              <a:latin typeface="Hiragino Kaku Gothic ProN W6" panose="020B0300000000000000" pitchFamily="34" charset="-128"/>
+              <a:ea typeface="Hiragino Kaku Gothic ProN W6" panose="020B0300000000000000" pitchFamily="34" charset="-128"/>
+            </a:endParaRPr>
+          </a:p>
+        </p:txBody>
+      </p:sp>
+    </p:spTree>
+    <p:extLst>
+      <p:ext uri="{BB962C8B-B14F-4D97-AF65-F5344CB8AC3E}">
+        <p14:creationId xmlns:p14="http://schemas.microsoft.com/office/powerpoint/2010/main" val="3900217861"/>
+      </p:ext>
+    </p:extLst>
+  </p:cSld>
+  <p:clrMapOvr>
+    <a:masterClrMapping/>
+  </p:clrMapOvr>
+</p:sld>
+</file>
+
+<file path=ppt/slides/slide2.xml><?xml version="1.0" encoding="utf-8"?>
+<p:sld xmlns:a="http://schemas.openxmlformats.org/drawingml/2006/main" xmlns:r="http://schemas.openxmlformats.org/officeDocument/2006/relationships" xmlns:p="http://schemas.openxmlformats.org/presentationml/2006/main">
+  <p:cSld>
+    <p:spTree>
+      <p:nvGrpSpPr>
+        <p:cNvPr id="1" name=""/>
+        <p:cNvGrpSpPr/>
+        <p:nvPr/>
+      </p:nvGrpSpPr>
+      <p:grpSpPr>
+        <a:xfrm>
+          <a:off x="0" y="0"/>
+          <a:ext cx="0" cy="0"/>
+          <a:chOff x="0" y="0"/>
+          <a:chExt cx="0" cy="0"/>
+        </a:xfrm>
+      </p:grpSpPr>
+      <p:sp>
+        <p:nvSpPr>
           <p:cNvPr id="4" name="テキスト ボックス 3">
             <a:extLst>
               <a:ext uri="{FF2B5EF4-FFF2-40B4-BE49-F238E27FC236}">
@@ -4278,7 +4379,7 @@
 </p:sld>
 </file>
 
-<file path=ppt/slides/slide2.xml><?xml version="1.0" encoding="utf-8"?>
+<file path=ppt/slides/slide3.xml><?xml version="1.0" encoding="utf-8"?>
 <p:sld xmlns:a="http://schemas.openxmlformats.org/drawingml/2006/main" xmlns:r="http://schemas.openxmlformats.org/officeDocument/2006/relationships" xmlns:p="http://schemas.openxmlformats.org/presentationml/2006/main">
   <p:cSld>
     <p:spTree>
@@ -4574,6 +4675,1539 @@
     <p:extLst>
       <p:ext uri="{BB962C8B-B14F-4D97-AF65-F5344CB8AC3E}">
         <p14:creationId xmlns:p14="http://schemas.microsoft.com/office/powerpoint/2010/main" val="2499947355"/>
+      </p:ext>
+    </p:extLst>
+  </p:cSld>
+  <p:clrMapOvr>
+    <a:masterClrMapping/>
+  </p:clrMapOvr>
+</p:sld>
+</file>
+
+<file path=ppt/slides/slide4.xml><?xml version="1.0" encoding="utf-8"?>
+<p:sld xmlns:a="http://schemas.openxmlformats.org/drawingml/2006/main" xmlns:r="http://schemas.openxmlformats.org/officeDocument/2006/relationships" xmlns:p="http://schemas.openxmlformats.org/presentationml/2006/main">
+  <p:cSld>
+    <p:spTree>
+      <p:nvGrpSpPr>
+        <p:cNvPr id="1" name=""/>
+        <p:cNvGrpSpPr/>
+        <p:nvPr/>
+      </p:nvGrpSpPr>
+      <p:grpSpPr>
+        <a:xfrm>
+          <a:off x="0" y="0"/>
+          <a:ext cx="0" cy="0"/>
+          <a:chOff x="0" y="0"/>
+          <a:chExt cx="0" cy="0"/>
+        </a:xfrm>
+      </p:grpSpPr>
+      <p:sp>
+        <p:nvSpPr>
+          <p:cNvPr id="4" name="テキスト ボックス 3">
+            <a:extLst>
+              <a:ext uri="{FF2B5EF4-FFF2-40B4-BE49-F238E27FC236}">
+                <a16:creationId xmlns:a16="http://schemas.microsoft.com/office/drawing/2014/main" id="{BCB8913A-3D76-5045-A532-999FAA7ED9F2}"/>
+              </a:ext>
+            </a:extLst>
+          </p:cNvPr>
+          <p:cNvSpPr txBox="1"/>
+          <p:nvPr/>
+        </p:nvSpPr>
+        <p:spPr>
+          <a:xfrm>
+            <a:off x="1474451" y="741685"/>
+            <a:ext cx="4491935" cy="584775"/>
+          </a:xfrm>
+          <a:prstGeom prst="rect">
+            <a:avLst/>
+          </a:prstGeom>
+          <a:noFill/>
+        </p:spPr>
+        <p:txBody>
+          <a:bodyPr wrap="none" rtlCol="0">
+            <a:spAutoFit/>
+          </a:bodyPr>
+          <a:lstStyle/>
+          <a:p>
+            <a:r>
+              <a:rPr lang="ja-JP" altLang="en-US" sz="3200">
+                <a:ea typeface="Hiragino Kaku Gothic ProN W3" panose="020B0300000000000000" pitchFamily="34" charset="-128"/>
+              </a:rPr>
+              <a:t>画面プロトタイプ</a:t>
+            </a:r>
+            <a:r>
+              <a:rPr lang="en-US" altLang="ja-JP" sz="3200" dirty="0">
+                <a:ea typeface="Hiragino Kaku Gothic ProN W3" panose="020B0300000000000000" pitchFamily="34" charset="-128"/>
+              </a:rPr>
+              <a:t>(1/2)</a:t>
+            </a:r>
+            <a:endParaRPr kumimoji="1" lang="ja-JP" altLang="en-US" sz="3200">
+              <a:ea typeface="Hiragino Kaku Gothic ProN W3" panose="020B0300000000000000" pitchFamily="34" charset="-128"/>
+            </a:endParaRPr>
+          </a:p>
+        </p:txBody>
+      </p:sp>
+      <p:pic>
+        <p:nvPicPr>
+          <p:cNvPr id="15" name="グラフィックス 14" descr="Gears">
+            <a:extLst>
+              <a:ext uri="{FF2B5EF4-FFF2-40B4-BE49-F238E27FC236}">
+                <a16:creationId xmlns:a16="http://schemas.microsoft.com/office/drawing/2014/main" id="{0F27930D-8A23-9B42-A0A4-4F52B3F45501}"/>
+              </a:ext>
+            </a:extLst>
+          </p:cNvPr>
+          <p:cNvPicPr>
+            <a:picLocks noChangeAspect="1"/>
+          </p:cNvPicPr>
+          <p:nvPr/>
+        </p:nvPicPr>
+        <p:blipFill>
+          <a:blip r:embed="rId2">
+            <a:extLst>
+              <a:ext uri="{28A0092B-C50C-407E-A947-70E740481C1C}">
+                <a14:useLocalDpi xmlns:a14="http://schemas.microsoft.com/office/drawing/2010/main" val="0"/>
+              </a:ext>
+              <a:ext uri="{96DAC541-7B7A-43D3-8B79-37D633B846F1}">
+                <asvg:svgBlip xmlns:asvg="http://schemas.microsoft.com/office/drawing/2016/SVG/main" r:embed="rId3"/>
+              </a:ext>
+            </a:extLst>
+          </a:blip>
+          <a:stretch>
+            <a:fillRect/>
+          </a:stretch>
+        </p:blipFill>
+        <p:spPr>
+          <a:xfrm>
+            <a:off x="560051" y="576873"/>
+            <a:ext cx="914400" cy="914400"/>
+          </a:xfrm>
+          <a:prstGeom prst="rect">
+            <a:avLst/>
+          </a:prstGeom>
+        </p:spPr>
+      </p:pic>
+      <p:sp>
+        <p:nvSpPr>
+          <p:cNvPr id="2" name="正方形/長方形 1">
+            <a:extLst>
+              <a:ext uri="{FF2B5EF4-FFF2-40B4-BE49-F238E27FC236}">
+                <a16:creationId xmlns:a16="http://schemas.microsoft.com/office/drawing/2014/main" id="{FA70DC7A-456F-E84B-865D-EFFEC679FADE}"/>
+              </a:ext>
+            </a:extLst>
+          </p:cNvPr>
+          <p:cNvSpPr/>
+          <p:nvPr/>
+        </p:nvSpPr>
+        <p:spPr>
+          <a:xfrm>
+            <a:off x="290947" y="1773382"/>
+            <a:ext cx="7615798" cy="4835237"/>
+          </a:xfrm>
+          <a:prstGeom prst="rect">
+            <a:avLst/>
+          </a:prstGeom>
+          <a:solidFill>
+            <a:schemeClr val="bg2"/>
+          </a:solidFill>
+          <a:ln>
+            <a:noFill/>
+          </a:ln>
+        </p:spPr>
+        <p:style>
+          <a:lnRef idx="2">
+            <a:schemeClr val="accent1">
+              <a:shade val="50000"/>
+            </a:schemeClr>
+          </a:lnRef>
+          <a:fillRef idx="1">
+            <a:schemeClr val="accent1"/>
+          </a:fillRef>
+          <a:effectRef idx="0">
+            <a:schemeClr val="accent1"/>
+          </a:effectRef>
+          <a:fontRef idx="minor">
+            <a:schemeClr val="lt1"/>
+          </a:fontRef>
+        </p:style>
+        <p:txBody>
+          <a:bodyPr rtlCol="0" anchor="ctr"/>
+          <a:lstStyle/>
+          <a:p>
+            <a:pPr algn="ctr"/>
+            <a:endParaRPr kumimoji="1" lang="ja-JP" altLang="en-US"/>
+          </a:p>
+        </p:txBody>
+      </p:sp>
+      <p:pic>
+        <p:nvPicPr>
+          <p:cNvPr id="21" name="Picture 4" descr="「テトリス」の画像検索結果">
+            <a:extLst>
+              <a:ext uri="{FF2B5EF4-FFF2-40B4-BE49-F238E27FC236}">
+                <a16:creationId xmlns:a16="http://schemas.microsoft.com/office/drawing/2014/main" id="{F7655A03-CB34-CA45-9106-5A7456D86071}"/>
+              </a:ext>
+            </a:extLst>
+          </p:cNvPr>
+          <p:cNvPicPr>
+            <a:picLocks noChangeAspect="1" noChangeArrowheads="1"/>
+          </p:cNvPicPr>
+          <p:nvPr/>
+        </p:nvPicPr>
+        <p:blipFill>
+          <a:blip r:embed="rId4">
+            <a:alphaModFix amt="20000"/>
+            <a:extLst>
+              <a:ext uri="{BEBA8EAE-BF5A-486C-A8C5-ECC9F3942E4B}">
+                <a14:imgProps xmlns:a14="http://schemas.microsoft.com/office/drawing/2010/main">
+                  <a14:imgLayer r:embed="rId5">
+                    <a14:imgEffect>
+                      <a14:colorTemperature colorTemp="11066"/>
+                    </a14:imgEffect>
+                  </a14:imgLayer>
+                </a14:imgProps>
+              </a:ext>
+              <a:ext uri="{28A0092B-C50C-407E-A947-70E740481C1C}">
+                <a14:useLocalDpi xmlns:a14="http://schemas.microsoft.com/office/drawing/2010/main" val="0"/>
+              </a:ext>
+            </a:extLst>
+          </a:blip>
+          <a:srcRect/>
+          <a:stretch>
+            <a:fillRect/>
+          </a:stretch>
+        </p:blipFill>
+        <p:spPr bwMode="auto">
+          <a:xfrm>
+            <a:off x="5210165" y="1807056"/>
+            <a:ext cx="2696579" cy="4793919"/>
+          </a:xfrm>
+          <a:prstGeom prst="rect">
+            <a:avLst/>
+          </a:prstGeom>
+          <a:noFill/>
+          <a:extLst>
+            <a:ext uri="{909E8E84-426E-40DD-AFC4-6F175D3DCCD1}">
+              <a14:hiddenFill xmlns:a14="http://schemas.microsoft.com/office/drawing/2010/main">
+                <a:solidFill>
+                  <a:srgbClr val="FFFFFF"/>
+                </a:solidFill>
+              </a14:hiddenFill>
+            </a:ext>
+          </a:extLst>
+        </p:spPr>
+      </p:pic>
+      <p:sp>
+        <p:nvSpPr>
+          <p:cNvPr id="29" name="フリーフォーム 28">
+            <a:extLst>
+              <a:ext uri="{FF2B5EF4-FFF2-40B4-BE49-F238E27FC236}">
+                <a16:creationId xmlns:a16="http://schemas.microsoft.com/office/drawing/2014/main" id="{81D56656-5BEC-8242-8824-EF393D5A115D}"/>
+              </a:ext>
+            </a:extLst>
+          </p:cNvPr>
+          <p:cNvSpPr/>
+          <p:nvPr/>
+        </p:nvSpPr>
+        <p:spPr>
+          <a:xfrm>
+            <a:off x="2492370" y="1773382"/>
+            <a:ext cx="4066085" cy="4835237"/>
+          </a:xfrm>
+          <a:custGeom>
+            <a:avLst/>
+            <a:gdLst>
+              <a:gd name="connsiteX0" fmla="*/ 0 w 3184634"/>
+              <a:gd name="connsiteY0" fmla="*/ 0 h 4887310"/>
+              <a:gd name="connsiteX1" fmla="*/ 3184634 w 3184634"/>
+              <a:gd name="connsiteY1" fmla="*/ 0 h 4887310"/>
+              <a:gd name="connsiteX2" fmla="*/ 2049517 w 3184634"/>
+              <a:gd name="connsiteY2" fmla="*/ 4887310 h 4887310"/>
+              <a:gd name="connsiteX3" fmla="*/ 15765 w 3184634"/>
+              <a:gd name="connsiteY3" fmla="*/ 4887310 h 4887310"/>
+              <a:gd name="connsiteX4" fmla="*/ 0 w 3184634"/>
+              <a:gd name="connsiteY4" fmla="*/ 0 h 4887310"/>
+            </a:gdLst>
+            <a:ahLst/>
+            <a:cxnLst>
+              <a:cxn ang="0">
+                <a:pos x="connsiteX0" y="connsiteY0"/>
+              </a:cxn>
+              <a:cxn ang="0">
+                <a:pos x="connsiteX1" y="connsiteY1"/>
+              </a:cxn>
+              <a:cxn ang="0">
+                <a:pos x="connsiteX2" y="connsiteY2"/>
+              </a:cxn>
+              <a:cxn ang="0">
+                <a:pos x="connsiteX3" y="connsiteY3"/>
+              </a:cxn>
+              <a:cxn ang="0">
+                <a:pos x="connsiteX4" y="connsiteY4"/>
+              </a:cxn>
+            </a:cxnLst>
+            <a:rect l="l" t="t" r="r" b="b"/>
+            <a:pathLst>
+              <a:path w="3184634" h="4887310">
+                <a:moveTo>
+                  <a:pt x="0" y="0"/>
+                </a:moveTo>
+                <a:lnTo>
+                  <a:pt x="3184634" y="0"/>
+                </a:lnTo>
+                <a:lnTo>
+                  <a:pt x="2049517" y="4887310"/>
+                </a:lnTo>
+                <a:lnTo>
+                  <a:pt x="15765" y="4887310"/>
+                </a:lnTo>
+                <a:lnTo>
+                  <a:pt x="0" y="0"/>
+                </a:lnTo>
+                <a:close/>
+              </a:path>
+            </a:pathLst>
+          </a:custGeom>
+          <a:solidFill>
+            <a:schemeClr val="accent5">
+              <a:lumMod val="75000"/>
+            </a:schemeClr>
+          </a:solidFill>
+          <a:ln>
+            <a:noFill/>
+          </a:ln>
+        </p:spPr>
+        <p:style>
+          <a:lnRef idx="2">
+            <a:schemeClr val="accent1">
+              <a:shade val="50000"/>
+            </a:schemeClr>
+          </a:lnRef>
+          <a:fillRef idx="1">
+            <a:schemeClr val="accent1"/>
+          </a:fillRef>
+          <a:effectRef idx="0">
+            <a:schemeClr val="accent1"/>
+          </a:effectRef>
+          <a:fontRef idx="minor">
+            <a:schemeClr val="lt1"/>
+          </a:fontRef>
+        </p:style>
+        <p:txBody>
+          <a:bodyPr rtlCol="0" anchor="ctr"/>
+          <a:lstStyle/>
+          <a:p>
+            <a:pPr algn="ctr"/>
+            <a:endParaRPr kumimoji="1" lang="ja-JP" altLang="en-US"/>
+          </a:p>
+        </p:txBody>
+      </p:sp>
+      <p:sp>
+        <p:nvSpPr>
+          <p:cNvPr id="13" name="フリーフォーム 12">
+            <a:extLst>
+              <a:ext uri="{FF2B5EF4-FFF2-40B4-BE49-F238E27FC236}">
+                <a16:creationId xmlns:a16="http://schemas.microsoft.com/office/drawing/2014/main" id="{6FC6120C-794C-8D4A-AC96-2C14FD815C2B}"/>
+              </a:ext>
+            </a:extLst>
+          </p:cNvPr>
+          <p:cNvSpPr/>
+          <p:nvPr/>
+        </p:nvSpPr>
+        <p:spPr>
+          <a:xfrm>
+            <a:off x="299544" y="1765738"/>
+            <a:ext cx="3421117" cy="4835237"/>
+          </a:xfrm>
+          <a:custGeom>
+            <a:avLst/>
+            <a:gdLst>
+              <a:gd name="connsiteX0" fmla="*/ 0 w 3184634"/>
+              <a:gd name="connsiteY0" fmla="*/ 0 h 4887310"/>
+              <a:gd name="connsiteX1" fmla="*/ 3184634 w 3184634"/>
+              <a:gd name="connsiteY1" fmla="*/ 0 h 4887310"/>
+              <a:gd name="connsiteX2" fmla="*/ 2049517 w 3184634"/>
+              <a:gd name="connsiteY2" fmla="*/ 4887310 h 4887310"/>
+              <a:gd name="connsiteX3" fmla="*/ 15765 w 3184634"/>
+              <a:gd name="connsiteY3" fmla="*/ 4887310 h 4887310"/>
+              <a:gd name="connsiteX4" fmla="*/ 0 w 3184634"/>
+              <a:gd name="connsiteY4" fmla="*/ 0 h 4887310"/>
+            </a:gdLst>
+            <a:ahLst/>
+            <a:cxnLst>
+              <a:cxn ang="0">
+                <a:pos x="connsiteX0" y="connsiteY0"/>
+              </a:cxn>
+              <a:cxn ang="0">
+                <a:pos x="connsiteX1" y="connsiteY1"/>
+              </a:cxn>
+              <a:cxn ang="0">
+                <a:pos x="connsiteX2" y="connsiteY2"/>
+              </a:cxn>
+              <a:cxn ang="0">
+                <a:pos x="connsiteX3" y="connsiteY3"/>
+              </a:cxn>
+              <a:cxn ang="0">
+                <a:pos x="connsiteX4" y="connsiteY4"/>
+              </a:cxn>
+            </a:cxnLst>
+            <a:rect l="l" t="t" r="r" b="b"/>
+            <a:pathLst>
+              <a:path w="3184634" h="4887310">
+                <a:moveTo>
+                  <a:pt x="0" y="0"/>
+                </a:moveTo>
+                <a:lnTo>
+                  <a:pt x="3184634" y="0"/>
+                </a:lnTo>
+                <a:lnTo>
+                  <a:pt x="2049517" y="4887310"/>
+                </a:lnTo>
+                <a:lnTo>
+                  <a:pt x="15765" y="4887310"/>
+                </a:lnTo>
+                <a:lnTo>
+                  <a:pt x="0" y="0"/>
+                </a:lnTo>
+                <a:close/>
+              </a:path>
+            </a:pathLst>
+          </a:custGeom>
+          <a:solidFill>
+            <a:schemeClr val="accent5">
+              <a:lumMod val="40000"/>
+              <a:lumOff val="60000"/>
+            </a:schemeClr>
+          </a:solidFill>
+          <a:ln>
+            <a:noFill/>
+          </a:ln>
+        </p:spPr>
+        <p:style>
+          <a:lnRef idx="2">
+            <a:schemeClr val="accent1">
+              <a:shade val="50000"/>
+            </a:schemeClr>
+          </a:lnRef>
+          <a:fillRef idx="1">
+            <a:schemeClr val="accent1"/>
+          </a:fillRef>
+          <a:effectRef idx="0">
+            <a:schemeClr val="accent1"/>
+          </a:effectRef>
+          <a:fontRef idx="minor">
+            <a:schemeClr val="lt1"/>
+          </a:fontRef>
+        </p:style>
+        <p:txBody>
+          <a:bodyPr rtlCol="0" anchor="ctr"/>
+          <a:lstStyle/>
+          <a:p>
+            <a:pPr algn="ctr"/>
+            <a:endParaRPr kumimoji="1" lang="ja-JP" altLang="en-US"/>
+          </a:p>
+        </p:txBody>
+      </p:sp>
+      <p:pic>
+        <p:nvPicPr>
+          <p:cNvPr id="3" name="Picture 2" descr="「テトリス　ロゴ」の画像検索結果">
+            <a:extLst>
+              <a:ext uri="{FF2B5EF4-FFF2-40B4-BE49-F238E27FC236}">
+                <a16:creationId xmlns:a16="http://schemas.microsoft.com/office/drawing/2014/main" id="{B20A8C3C-F5D0-A744-BA4D-23F6E5AA4842}"/>
+              </a:ext>
+            </a:extLst>
+          </p:cNvPr>
+          <p:cNvPicPr>
+            <a:picLocks noChangeAspect="1" noChangeArrowheads="1"/>
+          </p:cNvPicPr>
+          <p:nvPr/>
+        </p:nvPicPr>
+        <p:blipFill>
+          <a:blip r:embed="rId6">
+            <a:extLst>
+              <a:ext uri="{28A0092B-C50C-407E-A947-70E740481C1C}">
+                <a14:useLocalDpi xmlns:a14="http://schemas.microsoft.com/office/drawing/2010/main" val="0"/>
+              </a:ext>
+            </a:extLst>
+          </a:blip>
+          <a:srcRect/>
+          <a:stretch>
+            <a:fillRect/>
+          </a:stretch>
+        </p:blipFill>
+        <p:spPr bwMode="auto">
+          <a:xfrm>
+            <a:off x="290946" y="1938195"/>
+            <a:ext cx="2942193" cy="1954924"/>
+          </a:xfrm>
+          <a:prstGeom prst="rect">
+            <a:avLst/>
+          </a:prstGeom>
+          <a:noFill/>
+          <a:extLst>
+            <a:ext uri="{909E8E84-426E-40DD-AFC4-6F175D3DCCD1}">
+              <a14:hiddenFill xmlns:a14="http://schemas.microsoft.com/office/drawing/2010/main">
+                <a:solidFill>
+                  <a:srgbClr val="FFFFFF"/>
+                </a:solidFill>
+              </a14:hiddenFill>
+            </a:ext>
+          </a:extLst>
+        </p:spPr>
+      </p:pic>
+      <p:sp>
+        <p:nvSpPr>
+          <p:cNvPr id="14" name="角丸四角形 13">
+            <a:extLst>
+              <a:ext uri="{FF2B5EF4-FFF2-40B4-BE49-F238E27FC236}">
+                <a16:creationId xmlns:a16="http://schemas.microsoft.com/office/drawing/2014/main" id="{D8262704-653B-1F49-8083-FA25E3BAD3D7}"/>
+              </a:ext>
+            </a:extLst>
+          </p:cNvPr>
+          <p:cNvSpPr/>
+          <p:nvPr/>
+        </p:nvSpPr>
+        <p:spPr>
+          <a:xfrm>
+            <a:off x="477469" y="4093280"/>
+            <a:ext cx="1993963" cy="499009"/>
+          </a:xfrm>
+          <a:prstGeom prst="roundRect">
+            <a:avLst/>
+          </a:prstGeom>
+          <a:solidFill>
+            <a:schemeClr val="accent1">
+              <a:lumMod val="60000"/>
+              <a:lumOff val="40000"/>
+            </a:schemeClr>
+          </a:solidFill>
+          <a:ln>
+            <a:noFill/>
+          </a:ln>
+        </p:spPr>
+        <p:style>
+          <a:lnRef idx="2">
+            <a:schemeClr val="accent1">
+              <a:shade val="50000"/>
+            </a:schemeClr>
+          </a:lnRef>
+          <a:fillRef idx="1">
+            <a:schemeClr val="accent1"/>
+          </a:fillRef>
+          <a:effectRef idx="0">
+            <a:schemeClr val="accent1"/>
+          </a:effectRef>
+          <a:fontRef idx="minor">
+            <a:schemeClr val="lt1"/>
+          </a:fontRef>
+        </p:style>
+        <p:txBody>
+          <a:bodyPr rtlCol="0" anchor="ctr"/>
+          <a:lstStyle/>
+          <a:p>
+            <a:pPr algn="ctr"/>
+            <a:r>
+              <a:rPr lang="ja-JP" altLang="en-US">
+                <a:latin typeface="Hiragino Kaku Gothic ProN W3" panose="020B0300000000000000" pitchFamily="34" charset="-128"/>
+                <a:ea typeface="Hiragino Kaku Gothic ProN W3" panose="020B0300000000000000" pitchFamily="34" charset="-128"/>
+              </a:rPr>
+              <a:t>一人</a:t>
+            </a:r>
+            <a:r>
+              <a:rPr kumimoji="1" lang="ja-JP" altLang="en-US">
+                <a:latin typeface="Hiragino Kaku Gothic ProN W3" panose="020B0300000000000000" pitchFamily="34" charset="-128"/>
+                <a:ea typeface="Hiragino Kaku Gothic ProN W3" panose="020B0300000000000000" pitchFamily="34" charset="-128"/>
+              </a:rPr>
+              <a:t>であそぶ</a:t>
+            </a:r>
+          </a:p>
+        </p:txBody>
+      </p:sp>
+      <p:sp>
+        <p:nvSpPr>
+          <p:cNvPr id="25" name="角丸四角形 24">
+            <a:extLst>
+              <a:ext uri="{FF2B5EF4-FFF2-40B4-BE49-F238E27FC236}">
+                <a16:creationId xmlns:a16="http://schemas.microsoft.com/office/drawing/2014/main" id="{D8013F65-A304-DD40-976B-2827F3B488AB}"/>
+              </a:ext>
+            </a:extLst>
+          </p:cNvPr>
+          <p:cNvSpPr/>
+          <p:nvPr/>
+        </p:nvSpPr>
+        <p:spPr>
+          <a:xfrm>
+            <a:off x="477468" y="4770004"/>
+            <a:ext cx="1993963" cy="499009"/>
+          </a:xfrm>
+          <a:prstGeom prst="roundRect">
+            <a:avLst/>
+          </a:prstGeom>
+          <a:solidFill>
+            <a:schemeClr val="accent1">
+              <a:lumMod val="60000"/>
+              <a:lumOff val="40000"/>
+            </a:schemeClr>
+          </a:solidFill>
+          <a:ln>
+            <a:noFill/>
+          </a:ln>
+        </p:spPr>
+        <p:style>
+          <a:lnRef idx="2">
+            <a:schemeClr val="accent1">
+              <a:shade val="50000"/>
+            </a:schemeClr>
+          </a:lnRef>
+          <a:fillRef idx="1">
+            <a:schemeClr val="accent1"/>
+          </a:fillRef>
+          <a:effectRef idx="0">
+            <a:schemeClr val="accent1"/>
+          </a:effectRef>
+          <a:fontRef idx="minor">
+            <a:schemeClr val="lt1"/>
+          </a:fontRef>
+        </p:style>
+        <p:txBody>
+          <a:bodyPr rtlCol="0" anchor="ctr"/>
+          <a:lstStyle/>
+          <a:p>
+            <a:pPr algn="ctr"/>
+            <a:r>
+              <a:rPr kumimoji="1" lang="ja-JP" altLang="en-US">
+                <a:latin typeface="Hiragino Kaku Gothic ProN W3" panose="020B0300000000000000" pitchFamily="34" charset="-128"/>
+                <a:ea typeface="Hiragino Kaku Gothic ProN W3" panose="020B0300000000000000" pitchFamily="34" charset="-128"/>
+              </a:rPr>
+              <a:t>部屋を作る</a:t>
+            </a:r>
+          </a:p>
+        </p:txBody>
+      </p:sp>
+      <p:sp>
+        <p:nvSpPr>
+          <p:cNvPr id="28" name="角丸四角形 27">
+            <a:extLst>
+              <a:ext uri="{FF2B5EF4-FFF2-40B4-BE49-F238E27FC236}">
+                <a16:creationId xmlns:a16="http://schemas.microsoft.com/office/drawing/2014/main" id="{3A46BE47-27C6-C94E-A2FA-68E0E5CA8132}"/>
+              </a:ext>
+            </a:extLst>
+          </p:cNvPr>
+          <p:cNvSpPr/>
+          <p:nvPr/>
+        </p:nvSpPr>
+        <p:spPr>
+          <a:xfrm>
+            <a:off x="477467" y="5439806"/>
+            <a:ext cx="1993963" cy="499009"/>
+          </a:xfrm>
+          <a:prstGeom prst="roundRect">
+            <a:avLst/>
+          </a:prstGeom>
+          <a:solidFill>
+            <a:schemeClr val="accent1">
+              <a:lumMod val="60000"/>
+              <a:lumOff val="40000"/>
+            </a:schemeClr>
+          </a:solidFill>
+          <a:ln>
+            <a:noFill/>
+          </a:ln>
+        </p:spPr>
+        <p:style>
+          <a:lnRef idx="2">
+            <a:schemeClr val="accent1">
+              <a:shade val="50000"/>
+            </a:schemeClr>
+          </a:lnRef>
+          <a:fillRef idx="1">
+            <a:schemeClr val="accent1"/>
+          </a:fillRef>
+          <a:effectRef idx="0">
+            <a:schemeClr val="accent1"/>
+          </a:effectRef>
+          <a:fontRef idx="minor">
+            <a:schemeClr val="lt1"/>
+          </a:fontRef>
+        </p:style>
+        <p:txBody>
+          <a:bodyPr rtlCol="0" anchor="ctr"/>
+          <a:lstStyle/>
+          <a:p>
+            <a:pPr algn="ctr"/>
+            <a:r>
+              <a:rPr kumimoji="1" lang="ja-JP" altLang="en-US">
+                <a:latin typeface="Hiragino Kaku Gothic ProN W3" panose="020B0300000000000000" pitchFamily="34" charset="-128"/>
+                <a:ea typeface="Hiragino Kaku Gothic ProN W3" panose="020B0300000000000000" pitchFamily="34" charset="-128"/>
+              </a:rPr>
+              <a:t>部屋に参加する</a:t>
+            </a:r>
+          </a:p>
+        </p:txBody>
+      </p:sp>
+      <p:sp>
+        <p:nvSpPr>
+          <p:cNvPr id="19" name="テキスト ボックス 18">
+            <a:extLst>
+              <a:ext uri="{FF2B5EF4-FFF2-40B4-BE49-F238E27FC236}">
+                <a16:creationId xmlns:a16="http://schemas.microsoft.com/office/drawing/2014/main" id="{31CC2B84-CC17-2F4C-9884-727740586E64}"/>
+              </a:ext>
+            </a:extLst>
+          </p:cNvPr>
+          <p:cNvSpPr txBox="1"/>
+          <p:nvPr/>
+        </p:nvSpPr>
+        <p:spPr>
+          <a:xfrm>
+            <a:off x="3575111" y="3381851"/>
+            <a:ext cx="2022798" cy="461665"/>
+          </a:xfrm>
+          <a:prstGeom prst="rect">
+            <a:avLst/>
+          </a:prstGeom>
+          <a:noFill/>
+        </p:spPr>
+        <p:txBody>
+          <a:bodyPr wrap="square" rtlCol="0">
+            <a:spAutoFit/>
+          </a:bodyPr>
+          <a:lstStyle/>
+          <a:p>
+            <a:r>
+              <a:rPr kumimoji="1" lang="ja-JP" altLang="en-US" sz="2400">
+                <a:solidFill>
+                  <a:schemeClr val="bg1"/>
+                </a:solidFill>
+                <a:latin typeface="Hiragino Kaku Gothic ProN W3" panose="020B0300000000000000" pitchFamily="34" charset="-128"/>
+                <a:ea typeface="Hiragino Kaku Gothic ProN W3" panose="020B0300000000000000" pitchFamily="34" charset="-128"/>
+              </a:rPr>
+              <a:t>部屋番号？</a:t>
+            </a:r>
+          </a:p>
+        </p:txBody>
+      </p:sp>
+      <p:sp>
+        <p:nvSpPr>
+          <p:cNvPr id="23" name="角丸四角形 22">
+            <a:extLst>
+              <a:ext uri="{FF2B5EF4-FFF2-40B4-BE49-F238E27FC236}">
+                <a16:creationId xmlns:a16="http://schemas.microsoft.com/office/drawing/2014/main" id="{3A8773BE-EED4-EE4B-80F2-41AB75606DBD}"/>
+              </a:ext>
+            </a:extLst>
+          </p:cNvPr>
+          <p:cNvSpPr/>
+          <p:nvPr/>
+        </p:nvSpPr>
+        <p:spPr>
+          <a:xfrm>
+            <a:off x="3575111" y="4093280"/>
+            <a:ext cx="1868212" cy="434340"/>
+          </a:xfrm>
+          <a:prstGeom prst="roundRect">
+            <a:avLst/>
+          </a:prstGeom>
+          <a:solidFill>
+            <a:schemeClr val="bg1"/>
+          </a:solidFill>
+        </p:spPr>
+        <p:style>
+          <a:lnRef idx="2">
+            <a:schemeClr val="accent1">
+              <a:shade val="50000"/>
+            </a:schemeClr>
+          </a:lnRef>
+          <a:fillRef idx="1">
+            <a:schemeClr val="accent1"/>
+          </a:fillRef>
+          <a:effectRef idx="0">
+            <a:schemeClr val="accent1"/>
+          </a:effectRef>
+          <a:fontRef idx="minor">
+            <a:schemeClr val="lt1"/>
+          </a:fontRef>
+        </p:style>
+        <p:txBody>
+          <a:bodyPr rtlCol="0" anchor="ctr"/>
+          <a:lstStyle/>
+          <a:p>
+            <a:pPr algn="ctr"/>
+            <a:endParaRPr kumimoji="1" lang="ja-JP" altLang="en-US"/>
+          </a:p>
+        </p:txBody>
+      </p:sp>
+      <p:sp>
+        <p:nvSpPr>
+          <p:cNvPr id="32" name="角丸四角形 31">
+            <a:extLst>
+              <a:ext uri="{FF2B5EF4-FFF2-40B4-BE49-F238E27FC236}">
+                <a16:creationId xmlns:a16="http://schemas.microsoft.com/office/drawing/2014/main" id="{4EEBF28C-CE7F-4647-8011-C5F09D3E9F5B}"/>
+              </a:ext>
+            </a:extLst>
+          </p:cNvPr>
+          <p:cNvSpPr/>
+          <p:nvPr/>
+        </p:nvSpPr>
+        <p:spPr>
+          <a:xfrm>
+            <a:off x="3780062" y="4748031"/>
+            <a:ext cx="1359496" cy="453022"/>
+          </a:xfrm>
+          <a:prstGeom prst="roundRect">
+            <a:avLst/>
+          </a:prstGeom>
+          <a:solidFill>
+            <a:schemeClr val="accent5">
+              <a:lumMod val="50000"/>
+            </a:schemeClr>
+          </a:solidFill>
+        </p:spPr>
+        <p:style>
+          <a:lnRef idx="2">
+            <a:schemeClr val="accent1">
+              <a:shade val="50000"/>
+            </a:schemeClr>
+          </a:lnRef>
+          <a:fillRef idx="1">
+            <a:schemeClr val="accent1"/>
+          </a:fillRef>
+          <a:effectRef idx="0">
+            <a:schemeClr val="accent1"/>
+          </a:effectRef>
+          <a:fontRef idx="minor">
+            <a:schemeClr val="lt1"/>
+          </a:fontRef>
+        </p:style>
+        <p:txBody>
+          <a:bodyPr rtlCol="0" anchor="ctr"/>
+          <a:lstStyle/>
+          <a:p>
+            <a:pPr algn="ctr"/>
+            <a:r>
+              <a:rPr kumimoji="1" lang="ja-JP" altLang="en-US">
+                <a:latin typeface="Hiragino Kaku Gothic ProN W3" panose="020B0300000000000000" pitchFamily="34" charset="-128"/>
+                <a:ea typeface="Hiragino Kaku Gothic ProN W3" panose="020B0300000000000000" pitchFamily="34" charset="-128"/>
+              </a:rPr>
+              <a:t>参加する</a:t>
+            </a:r>
+          </a:p>
+        </p:txBody>
+      </p:sp>
+      <p:sp>
+        <p:nvSpPr>
+          <p:cNvPr id="24" name="テキスト ボックス 23">
+            <a:extLst>
+              <a:ext uri="{FF2B5EF4-FFF2-40B4-BE49-F238E27FC236}">
+                <a16:creationId xmlns:a16="http://schemas.microsoft.com/office/drawing/2014/main" id="{94F5C1E3-04B7-C84D-B3D0-5D8B0D54C79F}"/>
+              </a:ext>
+            </a:extLst>
+          </p:cNvPr>
+          <p:cNvSpPr txBox="1"/>
+          <p:nvPr/>
+        </p:nvSpPr>
+        <p:spPr>
+          <a:xfrm>
+            <a:off x="8407043" y="1938195"/>
+            <a:ext cx="3185487" cy="923330"/>
+          </a:xfrm>
+          <a:prstGeom prst="rect">
+            <a:avLst/>
+          </a:prstGeom>
+          <a:noFill/>
+        </p:spPr>
+        <p:txBody>
+          <a:bodyPr wrap="none" rtlCol="0">
+            <a:spAutoFit/>
+          </a:bodyPr>
+          <a:lstStyle/>
+          <a:p>
+            <a:r>
+              <a:rPr kumimoji="1" lang="ja-JP" altLang="en-US"/>
+              <a:t>なるべく画面数を減らすため</a:t>
+            </a:r>
+            <a:endParaRPr kumimoji="1" lang="en-US" altLang="ja-JP" dirty="0"/>
+          </a:p>
+          <a:p>
+            <a:r>
+              <a:rPr lang="en-US" altLang="ja-JP" dirty="0"/>
+              <a:t>1</a:t>
+            </a:r>
+            <a:r>
+              <a:rPr lang="ja-JP" altLang="en-US"/>
+              <a:t>画面に重なるような</a:t>
+            </a:r>
+            <a:r>
+              <a:rPr lang="en-US" altLang="ja-JP" dirty="0"/>
+              <a:t>UI</a:t>
+            </a:r>
+            <a:r>
+              <a:rPr lang="ja-JP" altLang="en-US"/>
+              <a:t>で</a:t>
+            </a:r>
+            <a:endParaRPr lang="en-US" altLang="ja-JP" dirty="0"/>
+          </a:p>
+          <a:p>
+            <a:r>
+              <a:rPr lang="ja-JP" altLang="en-US"/>
+              <a:t>お願いします</a:t>
+            </a:r>
+            <a:endParaRPr kumimoji="1" lang="ja-JP" altLang="en-US"/>
+          </a:p>
+        </p:txBody>
+      </p:sp>
+      <p:sp>
+        <p:nvSpPr>
+          <p:cNvPr id="34" name="テキスト ボックス 33">
+            <a:extLst>
+              <a:ext uri="{FF2B5EF4-FFF2-40B4-BE49-F238E27FC236}">
+                <a16:creationId xmlns:a16="http://schemas.microsoft.com/office/drawing/2014/main" id="{F6BB9427-D141-ED45-9FE1-C75EE7ABA79C}"/>
+              </a:ext>
+            </a:extLst>
+          </p:cNvPr>
+          <p:cNvSpPr txBox="1"/>
+          <p:nvPr/>
+        </p:nvSpPr>
+        <p:spPr>
+          <a:xfrm>
+            <a:off x="8407042" y="3073146"/>
+            <a:ext cx="3313728" cy="646331"/>
+          </a:xfrm>
+          <a:prstGeom prst="rect">
+            <a:avLst/>
+          </a:prstGeom>
+          <a:noFill/>
+        </p:spPr>
+        <p:txBody>
+          <a:bodyPr wrap="none" rtlCol="0">
+            <a:spAutoFit/>
+          </a:bodyPr>
+          <a:lstStyle/>
+          <a:p>
+            <a:r>
+              <a:rPr lang="ja-JP" altLang="en-US"/>
+              <a:t>最悪「</a:t>
+            </a:r>
+            <a:r>
+              <a:rPr lang="en-US" altLang="ja-JP" dirty="0"/>
+              <a:t>1</a:t>
+            </a:r>
+            <a:r>
+              <a:rPr lang="ja-JP" altLang="en-US"/>
+              <a:t>人であそぶ」モードは</a:t>
+            </a:r>
+            <a:endParaRPr lang="en-US" altLang="ja-JP" dirty="0"/>
+          </a:p>
+          <a:p>
+            <a:r>
+              <a:rPr kumimoji="1" lang="ja-JP" altLang="en-US"/>
+              <a:t>なくても構いません</a:t>
+            </a:r>
+          </a:p>
+        </p:txBody>
+      </p:sp>
+      <p:sp>
+        <p:nvSpPr>
+          <p:cNvPr id="35" name="テキスト ボックス 34">
+            <a:extLst>
+              <a:ext uri="{FF2B5EF4-FFF2-40B4-BE49-F238E27FC236}">
+                <a16:creationId xmlns:a16="http://schemas.microsoft.com/office/drawing/2014/main" id="{DEB1122B-2A7E-6541-8C51-9637EDE143B6}"/>
+              </a:ext>
+            </a:extLst>
+          </p:cNvPr>
+          <p:cNvSpPr txBox="1"/>
+          <p:nvPr/>
+        </p:nvSpPr>
+        <p:spPr>
+          <a:xfrm>
+            <a:off x="8458741" y="3987284"/>
+            <a:ext cx="2954655" cy="646331"/>
+          </a:xfrm>
+          <a:prstGeom prst="rect">
+            <a:avLst/>
+          </a:prstGeom>
+          <a:noFill/>
+        </p:spPr>
+        <p:txBody>
+          <a:bodyPr wrap="none" rtlCol="0">
+            <a:spAutoFit/>
+          </a:bodyPr>
+          <a:lstStyle/>
+          <a:p>
+            <a:r>
+              <a:rPr kumimoji="1" lang="ja-JP" altLang="en-US"/>
+              <a:t>デザインは適当なので都度</a:t>
+            </a:r>
+            <a:endParaRPr kumimoji="1" lang="en-US" altLang="ja-JP" dirty="0"/>
+          </a:p>
+          <a:p>
+            <a:r>
+              <a:rPr kumimoji="1" lang="ja-JP" altLang="en-US"/>
+              <a:t>修正して構いません</a:t>
+            </a:r>
+          </a:p>
+        </p:txBody>
+      </p:sp>
+    </p:spTree>
+    <p:extLst>
+      <p:ext uri="{BB962C8B-B14F-4D97-AF65-F5344CB8AC3E}">
+        <p14:creationId xmlns:p14="http://schemas.microsoft.com/office/powerpoint/2010/main" val="2835469517"/>
+      </p:ext>
+    </p:extLst>
+  </p:cSld>
+  <p:clrMapOvr>
+    <a:masterClrMapping/>
+  </p:clrMapOvr>
+</p:sld>
+</file>
+
+<file path=ppt/slides/slide5.xml><?xml version="1.0" encoding="utf-8"?>
+<p:sld xmlns:a="http://schemas.openxmlformats.org/drawingml/2006/main" xmlns:r="http://schemas.openxmlformats.org/officeDocument/2006/relationships" xmlns:p="http://schemas.openxmlformats.org/presentationml/2006/main">
+  <p:cSld>
+    <p:spTree>
+      <p:nvGrpSpPr>
+        <p:cNvPr id="1" name=""/>
+        <p:cNvGrpSpPr/>
+        <p:nvPr/>
+      </p:nvGrpSpPr>
+      <p:grpSpPr>
+        <a:xfrm>
+          <a:off x="0" y="0"/>
+          <a:ext cx="0" cy="0"/>
+          <a:chOff x="0" y="0"/>
+          <a:chExt cx="0" cy="0"/>
+        </a:xfrm>
+      </p:grpSpPr>
+      <p:sp>
+        <p:nvSpPr>
+          <p:cNvPr id="4" name="テキスト ボックス 3">
+            <a:extLst>
+              <a:ext uri="{FF2B5EF4-FFF2-40B4-BE49-F238E27FC236}">
+                <a16:creationId xmlns:a16="http://schemas.microsoft.com/office/drawing/2014/main" id="{BCB8913A-3D76-5045-A532-999FAA7ED9F2}"/>
+              </a:ext>
+            </a:extLst>
+          </p:cNvPr>
+          <p:cNvSpPr txBox="1"/>
+          <p:nvPr/>
+        </p:nvSpPr>
+        <p:spPr>
+          <a:xfrm>
+            <a:off x="1474451" y="741685"/>
+            <a:ext cx="4439036" cy="584775"/>
+          </a:xfrm>
+          <a:prstGeom prst="rect">
+            <a:avLst/>
+          </a:prstGeom>
+          <a:noFill/>
+        </p:spPr>
+        <p:txBody>
+          <a:bodyPr wrap="none" rtlCol="0">
+            <a:spAutoFit/>
+          </a:bodyPr>
+          <a:lstStyle/>
+          <a:p>
+            <a:r>
+              <a:rPr lang="ja-JP" altLang="en-US" sz="3200">
+                <a:ea typeface="Hiragino Kaku Gothic ProN W3" panose="020B0300000000000000" pitchFamily="34" charset="-128"/>
+              </a:rPr>
+              <a:t>画面プロトタイプ</a:t>
+            </a:r>
+            <a:r>
+              <a:rPr lang="en-US" altLang="ja-JP" sz="3200" dirty="0">
+                <a:ea typeface="Hiragino Kaku Gothic ProN W3" panose="020B0300000000000000" pitchFamily="34" charset="-128"/>
+              </a:rPr>
+              <a:t>(2/2)</a:t>
+            </a:r>
+            <a:endParaRPr kumimoji="1" lang="ja-JP" altLang="en-US" sz="3200">
+              <a:ea typeface="Hiragino Kaku Gothic ProN W3" panose="020B0300000000000000" pitchFamily="34" charset="-128"/>
+            </a:endParaRPr>
+          </a:p>
+        </p:txBody>
+      </p:sp>
+      <p:pic>
+        <p:nvPicPr>
+          <p:cNvPr id="15" name="グラフィックス 14" descr="Gears">
+            <a:extLst>
+              <a:ext uri="{FF2B5EF4-FFF2-40B4-BE49-F238E27FC236}">
+                <a16:creationId xmlns:a16="http://schemas.microsoft.com/office/drawing/2014/main" id="{0F27930D-8A23-9B42-A0A4-4F52B3F45501}"/>
+              </a:ext>
+            </a:extLst>
+          </p:cNvPr>
+          <p:cNvPicPr>
+            <a:picLocks noChangeAspect="1"/>
+          </p:cNvPicPr>
+          <p:nvPr/>
+        </p:nvPicPr>
+        <p:blipFill>
+          <a:blip r:embed="rId2">
+            <a:extLst>
+              <a:ext uri="{28A0092B-C50C-407E-A947-70E740481C1C}">
+                <a14:useLocalDpi xmlns:a14="http://schemas.microsoft.com/office/drawing/2010/main" val="0"/>
+              </a:ext>
+              <a:ext uri="{96DAC541-7B7A-43D3-8B79-37D633B846F1}">
+                <asvg:svgBlip xmlns:asvg="http://schemas.microsoft.com/office/drawing/2016/SVG/main" r:embed="rId3"/>
+              </a:ext>
+            </a:extLst>
+          </a:blip>
+          <a:stretch>
+            <a:fillRect/>
+          </a:stretch>
+        </p:blipFill>
+        <p:spPr>
+          <a:xfrm>
+            <a:off x="560051" y="576873"/>
+            <a:ext cx="914400" cy="914400"/>
+          </a:xfrm>
+          <a:prstGeom prst="rect">
+            <a:avLst/>
+          </a:prstGeom>
+        </p:spPr>
+      </p:pic>
+      <p:sp>
+        <p:nvSpPr>
+          <p:cNvPr id="2" name="正方形/長方形 1">
+            <a:extLst>
+              <a:ext uri="{FF2B5EF4-FFF2-40B4-BE49-F238E27FC236}">
+                <a16:creationId xmlns:a16="http://schemas.microsoft.com/office/drawing/2014/main" id="{FA70DC7A-456F-E84B-865D-EFFEC679FADE}"/>
+              </a:ext>
+            </a:extLst>
+          </p:cNvPr>
+          <p:cNvSpPr/>
+          <p:nvPr/>
+        </p:nvSpPr>
+        <p:spPr>
+          <a:xfrm>
+            <a:off x="290947" y="1773382"/>
+            <a:ext cx="7615798" cy="4835237"/>
+          </a:xfrm>
+          <a:prstGeom prst="rect">
+            <a:avLst/>
+          </a:prstGeom>
+          <a:solidFill>
+            <a:schemeClr val="bg2"/>
+          </a:solidFill>
+          <a:ln>
+            <a:noFill/>
+          </a:ln>
+        </p:spPr>
+        <p:style>
+          <a:lnRef idx="2">
+            <a:schemeClr val="accent1">
+              <a:shade val="50000"/>
+            </a:schemeClr>
+          </a:lnRef>
+          <a:fillRef idx="1">
+            <a:schemeClr val="accent1"/>
+          </a:fillRef>
+          <a:effectRef idx="0">
+            <a:schemeClr val="accent1"/>
+          </a:effectRef>
+          <a:fontRef idx="minor">
+            <a:schemeClr val="lt1"/>
+          </a:fontRef>
+        </p:style>
+        <p:txBody>
+          <a:bodyPr rtlCol="0" anchor="ctr"/>
+          <a:lstStyle/>
+          <a:p>
+            <a:pPr algn="ctr"/>
+            <a:endParaRPr kumimoji="1" lang="ja-JP" altLang="en-US"/>
+          </a:p>
+        </p:txBody>
+      </p:sp>
+      <p:pic>
+        <p:nvPicPr>
+          <p:cNvPr id="21" name="Picture 4" descr="「テトリス」の画像検索結果">
+            <a:extLst>
+              <a:ext uri="{FF2B5EF4-FFF2-40B4-BE49-F238E27FC236}">
+                <a16:creationId xmlns:a16="http://schemas.microsoft.com/office/drawing/2014/main" id="{F7655A03-CB34-CA45-9106-5A7456D86071}"/>
+              </a:ext>
+            </a:extLst>
+          </p:cNvPr>
+          <p:cNvPicPr>
+            <a:picLocks noChangeAspect="1" noChangeArrowheads="1"/>
+          </p:cNvPicPr>
+          <p:nvPr/>
+        </p:nvPicPr>
+        <p:blipFill>
+          <a:blip r:embed="rId4">
+            <a:alphaModFix/>
+            <a:extLst>
+              <a:ext uri="{BEBA8EAE-BF5A-486C-A8C5-ECC9F3942E4B}">
+                <a14:imgProps xmlns:a14="http://schemas.microsoft.com/office/drawing/2010/main">
+                  <a14:imgLayer r:embed="rId5">
+                    <a14:imgEffect>
+                      <a14:colorTemperature colorTemp="11066"/>
+                    </a14:imgEffect>
+                  </a14:imgLayer>
+                </a14:imgProps>
+              </a:ext>
+              <a:ext uri="{28A0092B-C50C-407E-A947-70E740481C1C}">
+                <a14:useLocalDpi xmlns:a14="http://schemas.microsoft.com/office/drawing/2010/main" val="0"/>
+              </a:ext>
+            </a:extLst>
+          </a:blip>
+          <a:srcRect/>
+          <a:stretch>
+            <a:fillRect/>
+          </a:stretch>
+        </p:blipFill>
+        <p:spPr bwMode="auto">
+          <a:xfrm>
+            <a:off x="5210165" y="1807056"/>
+            <a:ext cx="2696579" cy="4793919"/>
+          </a:xfrm>
+          <a:prstGeom prst="rect">
+            <a:avLst/>
+          </a:prstGeom>
+          <a:noFill/>
+          <a:extLst>
+            <a:ext uri="{909E8E84-426E-40DD-AFC4-6F175D3DCCD1}">
+              <a14:hiddenFill xmlns:a14="http://schemas.microsoft.com/office/drawing/2010/main">
+                <a:solidFill>
+                  <a:srgbClr val="FFFFFF"/>
+                </a:solidFill>
+              </a14:hiddenFill>
+            </a:ext>
+          </a:extLst>
+        </p:spPr>
+      </p:pic>
+      <p:sp>
+        <p:nvSpPr>
+          <p:cNvPr id="24" name="テキスト ボックス 23">
+            <a:extLst>
+              <a:ext uri="{FF2B5EF4-FFF2-40B4-BE49-F238E27FC236}">
+                <a16:creationId xmlns:a16="http://schemas.microsoft.com/office/drawing/2014/main" id="{94F5C1E3-04B7-C84D-B3D0-5D8B0D54C79F}"/>
+              </a:ext>
+            </a:extLst>
+          </p:cNvPr>
+          <p:cNvSpPr txBox="1"/>
+          <p:nvPr/>
+        </p:nvSpPr>
+        <p:spPr>
+          <a:xfrm>
+            <a:off x="8407043" y="1938195"/>
+            <a:ext cx="2723823" cy="923330"/>
+          </a:xfrm>
+          <a:prstGeom prst="rect">
+            <a:avLst/>
+          </a:prstGeom>
+          <a:noFill/>
+        </p:spPr>
+        <p:txBody>
+          <a:bodyPr wrap="none" rtlCol="0">
+            <a:spAutoFit/>
+          </a:bodyPr>
+          <a:lstStyle/>
+          <a:p>
+            <a:r>
+              <a:rPr kumimoji="1" lang="ja-JP" altLang="en-US"/>
+              <a:t>左側に自分のボードを、</a:t>
+            </a:r>
+            <a:endParaRPr lang="en-US" altLang="ja-JP" dirty="0"/>
+          </a:p>
+          <a:p>
+            <a:r>
+              <a:rPr kumimoji="1" lang="ja-JP" altLang="en-US"/>
+              <a:t>右側に相手のボードを</a:t>
+            </a:r>
+            <a:endParaRPr kumimoji="1" lang="en-US" altLang="ja-JP" dirty="0"/>
+          </a:p>
+          <a:p>
+            <a:r>
+              <a:rPr kumimoji="1" lang="ja-JP" altLang="en-US"/>
+              <a:t>表示してください</a:t>
+            </a:r>
+          </a:p>
+        </p:txBody>
+      </p:sp>
+      <p:pic>
+        <p:nvPicPr>
+          <p:cNvPr id="18" name="Picture 4" descr="「テトリス」の画像検索結果">
+            <a:extLst>
+              <a:ext uri="{FF2B5EF4-FFF2-40B4-BE49-F238E27FC236}">
+                <a16:creationId xmlns:a16="http://schemas.microsoft.com/office/drawing/2014/main" id="{EAB45182-FD5E-2241-86FE-0CB4BAA015BB}"/>
+              </a:ext>
+            </a:extLst>
+          </p:cNvPr>
+          <p:cNvPicPr>
+            <a:picLocks noChangeAspect="1" noChangeArrowheads="1"/>
+          </p:cNvPicPr>
+          <p:nvPr/>
+        </p:nvPicPr>
+        <p:blipFill>
+          <a:blip r:embed="rId4">
+            <a:alphaModFix/>
+            <a:extLst>
+              <a:ext uri="{BEBA8EAE-BF5A-486C-A8C5-ECC9F3942E4B}">
+                <a14:imgProps xmlns:a14="http://schemas.microsoft.com/office/drawing/2010/main">
+                  <a14:imgLayer r:embed="rId6">
+                    <a14:imgEffect>
+                      <a14:colorTemperature colorTemp="11066"/>
+                    </a14:imgEffect>
+                  </a14:imgLayer>
+                </a14:imgProps>
+              </a:ext>
+              <a:ext uri="{28A0092B-C50C-407E-A947-70E740481C1C}">
+                <a14:useLocalDpi xmlns:a14="http://schemas.microsoft.com/office/drawing/2010/main" val="0"/>
+              </a:ext>
+            </a:extLst>
+          </a:blip>
+          <a:srcRect/>
+          <a:stretch>
+            <a:fillRect/>
+          </a:stretch>
+        </p:blipFill>
+        <p:spPr bwMode="auto">
+          <a:xfrm>
+            <a:off x="290946" y="1794040"/>
+            <a:ext cx="2696579" cy="4793919"/>
+          </a:xfrm>
+          <a:prstGeom prst="rect">
+            <a:avLst/>
+          </a:prstGeom>
+          <a:noFill/>
+          <a:extLst>
+            <a:ext uri="{909E8E84-426E-40DD-AFC4-6F175D3DCCD1}">
+              <a14:hiddenFill xmlns:a14="http://schemas.microsoft.com/office/drawing/2010/main">
+                <a:solidFill>
+                  <a:srgbClr val="FFFFFF"/>
+                </a:solidFill>
+              </a14:hiddenFill>
+            </a:ext>
+          </a:extLst>
+        </p:spPr>
+      </p:pic>
+      <p:sp>
+        <p:nvSpPr>
+          <p:cNvPr id="5" name="テキスト ボックス 4">
+            <a:extLst>
+              <a:ext uri="{FF2B5EF4-FFF2-40B4-BE49-F238E27FC236}">
+                <a16:creationId xmlns:a16="http://schemas.microsoft.com/office/drawing/2014/main" id="{56D4B284-1291-F346-907B-F7F805A79A1B}"/>
+              </a:ext>
+            </a:extLst>
+          </p:cNvPr>
+          <p:cNvSpPr txBox="1"/>
+          <p:nvPr/>
+        </p:nvSpPr>
+        <p:spPr>
+          <a:xfrm>
+            <a:off x="3184445" y="5284060"/>
+            <a:ext cx="1828800" cy="1200329"/>
+          </a:xfrm>
+          <a:prstGeom prst="rect">
+            <a:avLst/>
+          </a:prstGeom>
+          <a:solidFill>
+            <a:schemeClr val="bg1"/>
+          </a:solidFill>
+        </p:spPr>
+        <p:txBody>
+          <a:bodyPr wrap="square" rtlCol="0">
+            <a:spAutoFit/>
+          </a:bodyPr>
+          <a:lstStyle/>
+          <a:p>
+            <a:r>
+              <a:rPr lang="en-US" altLang="ja-JP" dirty="0"/>
+              <a:t>l</a:t>
+            </a:r>
+            <a:r>
+              <a:rPr kumimoji="1" lang="en-US" altLang="ja-JP" dirty="0"/>
+              <a:t>og: xxx</a:t>
+            </a:r>
+          </a:p>
+          <a:p>
+            <a:r>
+              <a:rPr lang="en-US" altLang="ja-JP" dirty="0" err="1"/>
+              <a:t>xxxxx</a:t>
+            </a:r>
+            <a:endParaRPr lang="en-US" altLang="ja-JP" dirty="0"/>
+          </a:p>
+          <a:p>
+            <a:r>
+              <a:rPr lang="en-US" altLang="ja-JP" dirty="0" err="1"/>
+              <a:t>x</a:t>
+            </a:r>
+            <a:r>
+              <a:rPr kumimoji="1" lang="en-US" altLang="ja-JP" dirty="0" err="1"/>
+              <a:t>xxxx</a:t>
+            </a:r>
+            <a:endParaRPr kumimoji="1" lang="en-US" altLang="ja-JP" dirty="0"/>
+          </a:p>
+          <a:p>
+            <a:r>
+              <a:rPr lang="en-US" altLang="ja-JP" dirty="0" err="1"/>
+              <a:t>xxxxx</a:t>
+            </a:r>
+            <a:endParaRPr kumimoji="1" lang="ja-JP" altLang="en-US"/>
+          </a:p>
+        </p:txBody>
+      </p:sp>
+      <p:sp>
+        <p:nvSpPr>
+          <p:cNvPr id="20" name="テキスト ボックス 19">
+            <a:extLst>
+              <a:ext uri="{FF2B5EF4-FFF2-40B4-BE49-F238E27FC236}">
+                <a16:creationId xmlns:a16="http://schemas.microsoft.com/office/drawing/2014/main" id="{02DA6947-92F3-2C42-9853-B398303919F6}"/>
+              </a:ext>
+            </a:extLst>
+          </p:cNvPr>
+          <p:cNvSpPr txBox="1"/>
+          <p:nvPr/>
+        </p:nvSpPr>
+        <p:spPr>
+          <a:xfrm>
+            <a:off x="8407043" y="3267669"/>
+            <a:ext cx="2492990" cy="923330"/>
+          </a:xfrm>
+          <a:prstGeom prst="rect">
+            <a:avLst/>
+          </a:prstGeom>
+          <a:noFill/>
+        </p:spPr>
+        <p:txBody>
+          <a:bodyPr wrap="none" rtlCol="0">
+            <a:spAutoFit/>
+          </a:bodyPr>
+          <a:lstStyle/>
+          <a:p>
+            <a:r>
+              <a:rPr kumimoji="1" lang="ja-JP" altLang="en-US"/>
+              <a:t>中央は空いているので</a:t>
+            </a:r>
+            <a:endParaRPr kumimoji="1" lang="en-US" altLang="ja-JP" dirty="0"/>
+          </a:p>
+          <a:p>
+            <a:r>
+              <a:rPr lang="ja-JP" altLang="en-US"/>
+              <a:t>デバッグ用のログ等を</a:t>
+            </a:r>
+            <a:endParaRPr lang="en-US" altLang="ja-JP" dirty="0"/>
+          </a:p>
+          <a:p>
+            <a:r>
+              <a:rPr lang="ja-JP" altLang="en-US"/>
+              <a:t>表示しても構いません</a:t>
+            </a:r>
+            <a:endParaRPr lang="en-US" altLang="ja-JP" dirty="0"/>
+          </a:p>
+        </p:txBody>
+      </p:sp>
+      <p:sp>
+        <p:nvSpPr>
+          <p:cNvPr id="22" name="テキスト ボックス 21">
+            <a:extLst>
+              <a:ext uri="{FF2B5EF4-FFF2-40B4-BE49-F238E27FC236}">
+                <a16:creationId xmlns:a16="http://schemas.microsoft.com/office/drawing/2014/main" id="{551708EC-AAE6-4248-868C-8CC341F35C80}"/>
+              </a:ext>
+            </a:extLst>
+          </p:cNvPr>
+          <p:cNvSpPr txBox="1"/>
+          <p:nvPr/>
+        </p:nvSpPr>
+        <p:spPr>
+          <a:xfrm>
+            <a:off x="3184445" y="3959501"/>
+            <a:ext cx="1828800" cy="1200329"/>
+          </a:xfrm>
+          <a:prstGeom prst="rect">
+            <a:avLst/>
+          </a:prstGeom>
+          <a:solidFill>
+            <a:schemeClr val="bg1"/>
+          </a:solidFill>
+        </p:spPr>
+        <p:txBody>
+          <a:bodyPr wrap="square" rtlCol="0">
+            <a:spAutoFit/>
+          </a:bodyPr>
+          <a:lstStyle/>
+          <a:p>
+            <a:r>
+              <a:rPr lang="en-US" altLang="ja-JP" dirty="0"/>
+              <a:t>i</a:t>
+            </a:r>
+            <a:r>
+              <a:rPr kumimoji="1" lang="en-US" altLang="ja-JP" dirty="0"/>
+              <a:t>nput</a:t>
+            </a:r>
+            <a:r>
+              <a:rPr lang="en-US" altLang="ja-JP" dirty="0"/>
+              <a:t>:</a:t>
+            </a:r>
+          </a:p>
+          <a:p>
+            <a:r>
+              <a:rPr kumimoji="1" lang="en-US" altLang="ja-JP" dirty="0"/>
+              <a:t>L</a:t>
+            </a:r>
+          </a:p>
+          <a:p>
+            <a:r>
+              <a:rPr lang="en-US" altLang="ja-JP" dirty="0"/>
+              <a:t>L</a:t>
+            </a:r>
+          </a:p>
+          <a:p>
+            <a:r>
+              <a:rPr kumimoji="1" lang="en-US" altLang="ja-JP" dirty="0"/>
+              <a:t>R</a:t>
+            </a:r>
+            <a:endParaRPr kumimoji="1" lang="ja-JP" altLang="en-US"/>
+          </a:p>
+        </p:txBody>
+      </p:sp>
+      <p:sp>
+        <p:nvSpPr>
+          <p:cNvPr id="26" name="テキスト ボックス 25">
+            <a:extLst>
+              <a:ext uri="{FF2B5EF4-FFF2-40B4-BE49-F238E27FC236}">
+                <a16:creationId xmlns:a16="http://schemas.microsoft.com/office/drawing/2014/main" id="{FB655B89-E3CA-2D43-B0A6-85DBC44A1D97}"/>
+              </a:ext>
+            </a:extLst>
+          </p:cNvPr>
+          <p:cNvSpPr txBox="1"/>
+          <p:nvPr/>
+        </p:nvSpPr>
+        <p:spPr>
+          <a:xfrm>
+            <a:off x="8449067" y="4360730"/>
+            <a:ext cx="2262158" cy="923330"/>
+          </a:xfrm>
+          <a:prstGeom prst="rect">
+            <a:avLst/>
+          </a:prstGeom>
+          <a:noFill/>
+        </p:spPr>
+        <p:txBody>
+          <a:bodyPr wrap="none" rtlCol="0">
+            <a:spAutoFit/>
+          </a:bodyPr>
+          <a:lstStyle/>
+          <a:p>
+            <a:r>
+              <a:rPr lang="ja-JP" altLang="en-US"/>
+              <a:t>どこまでテトリスを</a:t>
+            </a:r>
+            <a:endParaRPr lang="en-US" altLang="ja-JP" dirty="0"/>
+          </a:p>
+          <a:p>
+            <a:r>
+              <a:rPr lang="ja-JP" altLang="en-US"/>
+              <a:t>本格的にするかは</a:t>
+            </a:r>
+            <a:endParaRPr lang="en-US" altLang="ja-JP" dirty="0"/>
+          </a:p>
+          <a:p>
+            <a:r>
+              <a:rPr lang="ja-JP" altLang="en-US"/>
+              <a:t>おまかせします</a:t>
+            </a:r>
+            <a:endParaRPr lang="en-US" altLang="ja-JP" dirty="0"/>
+          </a:p>
+        </p:txBody>
+      </p:sp>
+    </p:spTree>
+    <p:extLst>
+      <p:ext uri="{BB962C8B-B14F-4D97-AF65-F5344CB8AC3E}">
+        <p14:creationId xmlns:p14="http://schemas.microsoft.com/office/powerpoint/2010/main" val="579672542"/>
       </p:ext>
     </p:extLst>
   </p:cSld>

</xml_diff>